<commit_message>
Aulas HTML - Atualização
</commit_message>
<xml_diff>
--- a/01 Classes/Aula 03 Desenvolvimento Web - HTML.pptx
+++ b/01 Classes/Aula 03 Desenvolvimento Web - HTML.pptx
@@ -14959,8 +14959,61 @@
                 <a:latin typeface="Times New Roman" panose="02020603050405020304" pitchFamily="18" charset="0"/>
                 <a:cs typeface="Times New Roman" panose="02020603050405020304" pitchFamily="18" charset="0"/>
               </a:rPr>
-              <a:t>) é utilizado para destacar termos em outros idiomas ou citações.</a:t>
-            </a:r>
+              <a:t>) </a:t>
+            </a:r>
+            <a:r>
+              <a:rPr lang="pt-BR" sz="2400" dirty="0" err="1">
+                <a:latin typeface="Times New Roman" panose="02020603050405020304" pitchFamily="18" charset="0"/>
+                <a:cs typeface="Times New Roman" panose="02020603050405020304" pitchFamily="18" charset="0"/>
+              </a:rPr>
+              <a:t>tag</a:t>
+            </a:r>
+            <a:r>
+              <a:rPr lang="pt-BR" sz="2400" dirty="0">
+                <a:latin typeface="Times New Roman" panose="02020603050405020304" pitchFamily="18" charset="0"/>
+                <a:cs typeface="Times New Roman" panose="02020603050405020304" pitchFamily="18" charset="0"/>
+              </a:rPr>
+              <a:t> &lt;</a:t>
+            </a:r>
+            <a:r>
+              <a:rPr lang="pt-BR" sz="2400" b="1" dirty="0">
+                <a:latin typeface="Times New Roman" panose="02020603050405020304" pitchFamily="18" charset="0"/>
+                <a:cs typeface="Times New Roman" panose="02020603050405020304" pitchFamily="18" charset="0"/>
+              </a:rPr>
+              <a:t>i</a:t>
+            </a:r>
+            <a:r>
+              <a:rPr lang="pt-BR" sz="2400" dirty="0">
+                <a:latin typeface="Times New Roman" panose="02020603050405020304" pitchFamily="18" charset="0"/>
+                <a:cs typeface="Times New Roman" panose="02020603050405020304" pitchFamily="18" charset="0"/>
+              </a:rPr>
+              <a:t>&gt; é utilizado para destacar termos em outros idiomas ou citações ou </a:t>
+            </a:r>
+            <a:r>
+              <a:rPr lang="pt-BR" sz="2400" dirty="0" err="1">
+                <a:latin typeface="Times New Roman" panose="02020603050405020304" pitchFamily="18" charset="0"/>
+                <a:cs typeface="Times New Roman" panose="02020603050405020304" pitchFamily="18" charset="0"/>
+              </a:rPr>
+              <a:t>tag</a:t>
+            </a:r>
+            <a:r>
+              <a:rPr lang="pt-BR" sz="2400" dirty="0">
+                <a:latin typeface="Times New Roman" panose="02020603050405020304" pitchFamily="18" charset="0"/>
+                <a:cs typeface="Times New Roman" panose="02020603050405020304" pitchFamily="18" charset="0"/>
+              </a:rPr>
+              <a:t> &lt;em&gt; itálico para ênfase </a:t>
+            </a:r>
+            <a:r>
+              <a:rPr lang="pt-BR" sz="2400">
+                <a:latin typeface="Times New Roman" panose="02020603050405020304" pitchFamily="18" charset="0"/>
+                <a:cs typeface="Times New Roman" panose="02020603050405020304" pitchFamily="18" charset="0"/>
+              </a:rPr>
+              <a:t>em palavras.</a:t>
+            </a:r>
+            <a:endParaRPr lang="pt-BR" sz="2400" dirty="0">
+              <a:latin typeface="Times New Roman" panose="02020603050405020304" pitchFamily="18" charset="0"/>
+              <a:cs typeface="Times New Roman" panose="02020603050405020304" pitchFamily="18" charset="0"/>
+            </a:endParaRPr>
           </a:p>
           <a:p>
             <a:pPr marL="0" indent="0" algn="just">

</xml_diff>